<commit_message>
feat: Keycloak & User REST API implementiert
Anwendung kann jetzt auf Keycloak zugreifen und die Daten daraus erhalten. REST Schnittstelle zum Erhalt der Daten hinzugefügt.
Refs: SCP-2, SCP-107
Time: 5.5 h
</commit_message>
<xml_diff>
--- a/Dokumente/Sport Challenge Projekt Zwischenpräsentation Final V2.pptx
+++ b/Dokumente/Sport Challenge Projekt Zwischenpräsentation Final V2.pptx
@@ -16,8 +16,8 @@
     <p:sldId id="294" r:id="rId4"/>
     <p:sldId id="257" r:id="rId5"/>
     <p:sldId id="295" r:id="rId6"/>
-    <p:sldId id="258" r:id="rId7"/>
-    <p:sldId id="275" r:id="rId8"/>
+    <p:sldId id="275" r:id="rId7"/>
+    <p:sldId id="258" r:id="rId8"/>
     <p:sldId id="260" r:id="rId9"/>
     <p:sldId id="279" r:id="rId10"/>
     <p:sldId id="290" r:id="rId11"/>
@@ -142,8 +142,8 @@
             <p14:sldId id="294"/>
             <p14:sldId id="257"/>
             <p14:sldId id="295"/>
+            <p14:sldId id="275"/>
             <p14:sldId id="258"/>
-            <p14:sldId id="275"/>
           </p14:sldIdLst>
         </p14:section>
         <p14:section name="Tom" id="{A9761E40-B8C8-44A5-BFBD-8FD6DEE85D24}">
@@ -195,17 +195,54 @@
 <pc:chgInfo xmlns:a="http://schemas.openxmlformats.org/drawingml/2006/main" xmlns:r="http://schemas.openxmlformats.org/officeDocument/2006/relationships" xmlns:ac="http://schemas.microsoft.com/office/drawing/2013/main/command" xmlns:pc="http://schemas.microsoft.com/office/powerpoint/2013/main/command">
   <pc:docChgLst>
     <pc:chgData name="Jason Duffy" userId="96d836a7-e137-45ee-93ec-e5d8e4b16da5" providerId="ADAL" clId="{2E96322F-A5D6-4911-9CC0-5844871DF808}"/>
-    <pc:docChg chg="modSld">
-      <pc:chgData name="Jason Duffy" userId="96d836a7-e137-45ee-93ec-e5d8e4b16da5" providerId="ADAL" clId="{2E96322F-A5D6-4911-9CC0-5844871DF808}" dt="2023-04-20T06:21:50.742" v="0"/>
+    <pc:docChg chg="modSld sldOrd">
+      <pc:chgData name="Jason Duffy" userId="96d836a7-e137-45ee-93ec-e5d8e4b16da5" providerId="ADAL" clId="{2E96322F-A5D6-4911-9CC0-5844871DF808}" dt="2023-04-20T08:46:55.833" v="4" actId="1076"/>
       <pc:docMkLst>
         <pc:docMk/>
       </pc:docMkLst>
+      <pc:sldChg chg="modSp mod">
+        <pc:chgData name="Jason Duffy" userId="96d836a7-e137-45ee-93ec-e5d8e4b16da5" providerId="ADAL" clId="{2E96322F-A5D6-4911-9CC0-5844871DF808}" dt="2023-04-20T08:46:55.833" v="4" actId="1076"/>
+        <pc:sldMkLst>
+          <pc:docMk/>
+          <pc:sldMk cId="3164393377" sldId="256"/>
+        </pc:sldMkLst>
+        <pc:spChg chg="mod">
+          <ac:chgData name="Jason Duffy" userId="96d836a7-e137-45ee-93ec-e5d8e4b16da5" providerId="ADAL" clId="{2E96322F-A5D6-4911-9CC0-5844871DF808}" dt="2023-04-20T08:46:55.833" v="4" actId="1076"/>
+          <ac:spMkLst>
+            <pc:docMk/>
+            <pc:sldMk cId="3164393377" sldId="256"/>
+            <ac:spMk id="13" creationId="{1AB05D31-D189-A5B9-08EB-9A4315F46804}"/>
+          </ac:spMkLst>
+        </pc:spChg>
+      </pc:sldChg>
       <pc:sldChg chg="modTransition">
         <pc:chgData name="Jason Duffy" userId="96d836a7-e137-45ee-93ec-e5d8e4b16da5" providerId="ADAL" clId="{2E96322F-A5D6-4911-9CC0-5844871DF808}" dt="2023-04-20T06:21:50.742" v="0"/>
         <pc:sldMkLst>
           <pc:docMk/>
           <pc:sldMk cId="183151242" sldId="268"/>
         </pc:sldMkLst>
+      </pc:sldChg>
+      <pc:sldChg chg="ord">
+        <pc:chgData name="Jason Duffy" userId="96d836a7-e137-45ee-93ec-e5d8e4b16da5" providerId="ADAL" clId="{2E96322F-A5D6-4911-9CC0-5844871DF808}" dt="2023-04-20T07:23:59.752" v="2"/>
+        <pc:sldMkLst>
+          <pc:docMk/>
+          <pc:sldMk cId="2905519449" sldId="275"/>
+        </pc:sldMkLst>
+      </pc:sldChg>
+      <pc:sldChg chg="modSp mod">
+        <pc:chgData name="Jason Duffy" userId="96d836a7-e137-45ee-93ec-e5d8e4b16da5" providerId="ADAL" clId="{2E96322F-A5D6-4911-9CC0-5844871DF808}" dt="2023-04-20T08:09:02.772" v="3" actId="20577"/>
+        <pc:sldMkLst>
+          <pc:docMk/>
+          <pc:sldMk cId="3726983619" sldId="282"/>
+        </pc:sldMkLst>
+        <pc:graphicFrameChg chg="modGraphic">
+          <ac:chgData name="Jason Duffy" userId="96d836a7-e137-45ee-93ec-e5d8e4b16da5" providerId="ADAL" clId="{2E96322F-A5D6-4911-9CC0-5844871DF808}" dt="2023-04-20T08:09:02.772" v="3" actId="20577"/>
+          <ac:graphicFrameMkLst>
+            <pc:docMk/>
+            <pc:sldMk cId="3726983619" sldId="282"/>
+            <ac:graphicFrameMk id="11" creationId="{4D83F283-5910-2E85-F0EA-FC8A895B9499}"/>
+          </ac:graphicFrameMkLst>
+        </pc:graphicFrameChg>
       </pc:sldChg>
     </pc:docChg>
   </pc:docChgLst>
@@ -1064,14 +1101,14 @@
               <a:defRPr/>
             </a:pPr>
             <a:r>
-              <a:rPr lang="de-DE">
+              <a:rPr lang="de-DE" dirty="0">
                 <a:ea typeface="+mn-lt"/>
                 <a:cs typeface="+mn-lt"/>
                 <a:hlinkClick r:id="rId3"/>
               </a:rPr>
               <a:t>https://www.figma.com/file/Da7M5IRryhv2g9f0ncDDrl/SCP-Prototyp?node-id=0-1&amp;t=ZlcD3ZckKX5SFaHy-0</a:t>
             </a:r>
-            <a:endParaRPr lang="de-DE">
+            <a:endParaRPr lang="de-DE" dirty="0">
               <a:ea typeface="+mn-lt"/>
               <a:cs typeface="+mn-lt"/>
             </a:endParaRPr>
@@ -5251,7 +5288,7 @@
           <a:lstStyle/>
           <a:p>
             <a:r>
-              <a:rPr lang="de-DE" b="1"/>
+              <a:rPr lang="de-DE" b="1" dirty="0"/>
               <a:t>Sport Challenge Projekt</a:t>
             </a:r>
           </a:p>
@@ -5565,7 +5602,7 @@
         </p:nvSpPr>
         <p:spPr>
           <a:xfrm>
-            <a:off x="3415643" y="6120704"/>
+            <a:off x="3581400" y="6120704"/>
             <a:ext cx="5029200" cy="365125"/>
           </a:xfrm>
           <a:prstGeom prst="rect">
@@ -5671,7 +5708,7 @@
           </a:lstStyle>
           <a:p>
             <a:r>
-              <a:rPr lang="de-DE"/>
+              <a:rPr lang="de-DE" dirty="0"/>
               <a:t>Jason Patrick Duffy, Robin Hackh, Tom Nguyen Dinh, Mason Schönherr</a:t>
             </a:r>
           </a:p>
@@ -11853,7 +11890,7 @@
           <p:nvPr>
             <p:extLst>
               <p:ext uri="{D42A27DB-BD31-4B8C-83A1-F6EECF244321}">
-                <p14:modId xmlns:p14="http://schemas.microsoft.com/office/powerpoint/2010/main" val="531497135"/>
+                <p14:modId xmlns:p14="http://schemas.microsoft.com/office/powerpoint/2010/main" val="704139416"/>
               </p:ext>
             </p:extLst>
           </p:nvPr>
@@ -12411,12 +12448,12 @@
                         <a:defRPr/>
                       </a:pPr>
                       <a:r>
-                        <a:rPr lang="de-DE" sz="2400" strike="noStrike">
+                        <a:rPr lang="de-DE" sz="2400" strike="noStrike" dirty="0">
                           <a:solidFill>
                             <a:srgbClr val="515151"/>
                           </a:solidFill>
                         </a:rPr>
-                        <a:t>Workshop mit dem Kunden</a:t>
+                        <a:t>Workshops mit dem Kunden</a:t>
                       </a:r>
                     </a:p>
                   </a:txBody>
@@ -22571,6 +22608,767 @@
           <p:cNvPr id="2" name="Titel 1">
             <a:extLst>
               <a:ext uri="{FF2B5EF4-FFF2-40B4-BE49-F238E27FC236}">
+                <a16:creationId xmlns:a16="http://schemas.microsoft.com/office/drawing/2014/main" id="{51B73323-BE47-CBF1-1728-BAAB86B82B5D}"/>
+              </a:ext>
+            </a:extLst>
+          </p:cNvPr>
+          <p:cNvSpPr>
+            <a:spLocks noGrp="1"/>
+          </p:cNvSpPr>
+          <p:nvPr>
+            <p:ph type="title"/>
+          </p:nvPr>
+        </p:nvSpPr>
+        <p:spPr/>
+        <p:txBody>
+          <a:bodyPr>
+            <a:normAutofit fontScale="90000"/>
+          </a:bodyPr>
+          <a:lstStyle/>
+          <a:p>
+            <a:r>
+              <a:rPr lang="de-DE">
+                <a:cs typeface="Calibri Light"/>
+              </a:rPr>
+              <a:t>Projekt</a:t>
+            </a:r>
+            <a:endParaRPr lang="de-DE"/>
+          </a:p>
+        </p:txBody>
+      </p:sp>
+      <p:sp>
+        <p:nvSpPr>
+          <p:cNvPr id="5" name="Foliennummernplatzhalter 4">
+            <a:extLst>
+              <a:ext uri="{FF2B5EF4-FFF2-40B4-BE49-F238E27FC236}">
+                <a16:creationId xmlns:a16="http://schemas.microsoft.com/office/drawing/2014/main" id="{BCE830FB-0B68-E833-D5A1-5B700A2601D9}"/>
+              </a:ext>
+            </a:extLst>
+          </p:cNvPr>
+          <p:cNvSpPr>
+            <a:spLocks noGrp="1"/>
+          </p:cNvSpPr>
+          <p:nvPr>
+            <p:ph type="sldNum" sz="quarter" idx="12"/>
+          </p:nvPr>
+        </p:nvSpPr>
+        <p:spPr/>
+        <p:txBody>
+          <a:bodyPr/>
+          <a:lstStyle/>
+          <a:p>
+            <a:fld id="{89FC54A0-61CC-4F67-9F0E-F272352AC899}" type="slidenum">
+              <a:rPr lang="de-DE" smtClean="0"/>
+              <a:t>6</a:t>
+            </a:fld>
+            <a:endParaRPr lang="de-DE"/>
+          </a:p>
+        </p:txBody>
+      </p:sp>
+      <p:sp>
+        <p:nvSpPr>
+          <p:cNvPr id="14" name="Freihandform: Form 13">
+            <a:extLst>
+              <a:ext uri="{FF2B5EF4-FFF2-40B4-BE49-F238E27FC236}">
+                <a16:creationId xmlns:a16="http://schemas.microsoft.com/office/drawing/2014/main" id="{C7323C94-3B52-A43D-9452-34D25FF840DF}"/>
+              </a:ext>
+            </a:extLst>
+          </p:cNvPr>
+          <p:cNvSpPr/>
+          <p:nvPr/>
+        </p:nvSpPr>
+        <p:spPr>
+          <a:xfrm>
+            <a:off x="2032000" y="1852612"/>
+            <a:ext cx="8128000" cy="1597050"/>
+          </a:xfrm>
+          <a:custGeom>
+            <a:avLst/>
+            <a:gdLst>
+              <a:gd name="connsiteX0" fmla="*/ 0 w 8128000"/>
+              <a:gd name="connsiteY0" fmla="*/ 266180 h 1597050"/>
+              <a:gd name="connsiteX1" fmla="*/ 266180 w 8128000"/>
+              <a:gd name="connsiteY1" fmla="*/ 0 h 1597050"/>
+              <a:gd name="connsiteX2" fmla="*/ 7861820 w 8128000"/>
+              <a:gd name="connsiteY2" fmla="*/ 0 h 1597050"/>
+              <a:gd name="connsiteX3" fmla="*/ 8128000 w 8128000"/>
+              <a:gd name="connsiteY3" fmla="*/ 266180 h 1597050"/>
+              <a:gd name="connsiteX4" fmla="*/ 8128000 w 8128000"/>
+              <a:gd name="connsiteY4" fmla="*/ 1330870 h 1597050"/>
+              <a:gd name="connsiteX5" fmla="*/ 7861820 w 8128000"/>
+              <a:gd name="connsiteY5" fmla="*/ 1597050 h 1597050"/>
+              <a:gd name="connsiteX6" fmla="*/ 266180 w 8128000"/>
+              <a:gd name="connsiteY6" fmla="*/ 1597050 h 1597050"/>
+              <a:gd name="connsiteX7" fmla="*/ 0 w 8128000"/>
+              <a:gd name="connsiteY7" fmla="*/ 1330870 h 1597050"/>
+              <a:gd name="connsiteX8" fmla="*/ 0 w 8128000"/>
+              <a:gd name="connsiteY8" fmla="*/ 266180 h 1597050"/>
+            </a:gdLst>
+            <a:ahLst/>
+            <a:cxnLst>
+              <a:cxn ang="0">
+                <a:pos x="connsiteX0" y="connsiteY0"/>
+              </a:cxn>
+              <a:cxn ang="0">
+                <a:pos x="connsiteX1" y="connsiteY1"/>
+              </a:cxn>
+              <a:cxn ang="0">
+                <a:pos x="connsiteX2" y="connsiteY2"/>
+              </a:cxn>
+              <a:cxn ang="0">
+                <a:pos x="connsiteX3" y="connsiteY3"/>
+              </a:cxn>
+              <a:cxn ang="0">
+                <a:pos x="connsiteX4" y="connsiteY4"/>
+              </a:cxn>
+              <a:cxn ang="0">
+                <a:pos x="connsiteX5" y="connsiteY5"/>
+              </a:cxn>
+              <a:cxn ang="0">
+                <a:pos x="connsiteX6" y="connsiteY6"/>
+              </a:cxn>
+              <a:cxn ang="0">
+                <a:pos x="connsiteX7" y="connsiteY7"/>
+              </a:cxn>
+              <a:cxn ang="0">
+                <a:pos x="connsiteX8" y="connsiteY8"/>
+              </a:cxn>
+            </a:cxnLst>
+            <a:rect l="l" t="t" r="r" b="b"/>
+            <a:pathLst>
+              <a:path w="8128000" h="1597050">
+                <a:moveTo>
+                  <a:pt x="0" y="266180"/>
+                </a:moveTo>
+                <a:cubicBezTo>
+                  <a:pt x="0" y="119173"/>
+                  <a:pt x="119173" y="0"/>
+                  <a:pt x="266180" y="0"/>
+                </a:cubicBezTo>
+                <a:lnTo>
+                  <a:pt x="7861820" y="0"/>
+                </a:lnTo>
+                <a:cubicBezTo>
+                  <a:pt x="8008827" y="0"/>
+                  <a:pt x="8128000" y="119173"/>
+                  <a:pt x="8128000" y="266180"/>
+                </a:cubicBezTo>
+                <a:lnTo>
+                  <a:pt x="8128000" y="1330870"/>
+                </a:lnTo>
+                <a:cubicBezTo>
+                  <a:pt x="8128000" y="1477877"/>
+                  <a:pt x="8008827" y="1597050"/>
+                  <a:pt x="7861820" y="1597050"/>
+                </a:cubicBezTo>
+                <a:lnTo>
+                  <a:pt x="266180" y="1597050"/>
+                </a:lnTo>
+                <a:cubicBezTo>
+                  <a:pt x="119173" y="1597050"/>
+                  <a:pt x="0" y="1477877"/>
+                  <a:pt x="0" y="1330870"/>
+                </a:cubicBezTo>
+                <a:lnTo>
+                  <a:pt x="0" y="266180"/>
+                </a:lnTo>
+                <a:close/>
+              </a:path>
+            </a:pathLst>
+          </a:custGeom>
+          <a:solidFill>
+            <a:srgbClr val="00A5E1"/>
+          </a:solidFill>
+        </p:spPr>
+        <p:style>
+          <a:lnRef idx="2">
+            <a:schemeClr val="lt1">
+              <a:hueOff val="0"/>
+              <a:satOff val="0"/>
+              <a:lumOff val="0"/>
+              <a:alphaOff val="0"/>
+            </a:schemeClr>
+          </a:lnRef>
+          <a:fillRef idx="1">
+            <a:scrgbClr r="0" g="0" b="0"/>
+          </a:fillRef>
+          <a:effectRef idx="0">
+            <a:schemeClr val="accent1">
+              <a:hueOff val="0"/>
+              <a:satOff val="0"/>
+              <a:lumOff val="0"/>
+              <a:alphaOff val="0"/>
+            </a:schemeClr>
+          </a:effectRef>
+          <a:fontRef idx="minor">
+            <a:schemeClr val="lt1"/>
+          </a:fontRef>
+        </p:style>
+        <p:txBody>
+          <a:bodyPr spcFirstLastPara="0" vert="horz" wrap="square" lIns="230362" tIns="230362" rIns="230362" bIns="230362" numCol="1" spcCol="1270" anchor="ctr" anchorCtr="0">
+            <a:noAutofit/>
+          </a:bodyPr>
+          <a:lstStyle/>
+          <a:p>
+            <a:pPr marL="0" lvl="0" indent="0" algn="l" defTabSz="1778000">
+              <a:lnSpc>
+                <a:spcPct val="90000"/>
+              </a:lnSpc>
+              <a:spcBef>
+                <a:spcPct val="0"/>
+              </a:spcBef>
+              <a:spcAft>
+                <a:spcPct val="35000"/>
+              </a:spcAft>
+              <a:buNone/>
+            </a:pPr>
+            <a:r>
+              <a:rPr lang="de-DE" sz="4000" kern="1200"/>
+              <a:t>Webplattform für die Sport Challenge</a:t>
+            </a:r>
+          </a:p>
+        </p:txBody>
+      </p:sp>
+      <p:sp>
+        <p:nvSpPr>
+          <p:cNvPr id="15" name="Freihandform: Form 14">
+            <a:extLst>
+              <a:ext uri="{FF2B5EF4-FFF2-40B4-BE49-F238E27FC236}">
+                <a16:creationId xmlns:a16="http://schemas.microsoft.com/office/drawing/2014/main" id="{1A43487B-6CF5-6D90-1B01-12C42648AD80}"/>
+              </a:ext>
+            </a:extLst>
+          </p:cNvPr>
+          <p:cNvSpPr/>
+          <p:nvPr/>
+        </p:nvSpPr>
+        <p:spPr>
+          <a:xfrm>
+            <a:off x="2032000" y="3636862"/>
+            <a:ext cx="8128000" cy="1597050"/>
+          </a:xfrm>
+          <a:custGeom>
+            <a:avLst/>
+            <a:gdLst>
+              <a:gd name="connsiteX0" fmla="*/ 0 w 8128000"/>
+              <a:gd name="connsiteY0" fmla="*/ 266180 h 1597050"/>
+              <a:gd name="connsiteX1" fmla="*/ 266180 w 8128000"/>
+              <a:gd name="connsiteY1" fmla="*/ 0 h 1597050"/>
+              <a:gd name="connsiteX2" fmla="*/ 7861820 w 8128000"/>
+              <a:gd name="connsiteY2" fmla="*/ 0 h 1597050"/>
+              <a:gd name="connsiteX3" fmla="*/ 8128000 w 8128000"/>
+              <a:gd name="connsiteY3" fmla="*/ 266180 h 1597050"/>
+              <a:gd name="connsiteX4" fmla="*/ 8128000 w 8128000"/>
+              <a:gd name="connsiteY4" fmla="*/ 1330870 h 1597050"/>
+              <a:gd name="connsiteX5" fmla="*/ 7861820 w 8128000"/>
+              <a:gd name="connsiteY5" fmla="*/ 1597050 h 1597050"/>
+              <a:gd name="connsiteX6" fmla="*/ 266180 w 8128000"/>
+              <a:gd name="connsiteY6" fmla="*/ 1597050 h 1597050"/>
+              <a:gd name="connsiteX7" fmla="*/ 0 w 8128000"/>
+              <a:gd name="connsiteY7" fmla="*/ 1330870 h 1597050"/>
+              <a:gd name="connsiteX8" fmla="*/ 0 w 8128000"/>
+              <a:gd name="connsiteY8" fmla="*/ 266180 h 1597050"/>
+            </a:gdLst>
+            <a:ahLst/>
+            <a:cxnLst>
+              <a:cxn ang="0">
+                <a:pos x="connsiteX0" y="connsiteY0"/>
+              </a:cxn>
+              <a:cxn ang="0">
+                <a:pos x="connsiteX1" y="connsiteY1"/>
+              </a:cxn>
+              <a:cxn ang="0">
+                <a:pos x="connsiteX2" y="connsiteY2"/>
+              </a:cxn>
+              <a:cxn ang="0">
+                <a:pos x="connsiteX3" y="connsiteY3"/>
+              </a:cxn>
+              <a:cxn ang="0">
+                <a:pos x="connsiteX4" y="connsiteY4"/>
+              </a:cxn>
+              <a:cxn ang="0">
+                <a:pos x="connsiteX5" y="connsiteY5"/>
+              </a:cxn>
+              <a:cxn ang="0">
+                <a:pos x="connsiteX6" y="connsiteY6"/>
+              </a:cxn>
+              <a:cxn ang="0">
+                <a:pos x="connsiteX7" y="connsiteY7"/>
+              </a:cxn>
+              <a:cxn ang="0">
+                <a:pos x="connsiteX8" y="connsiteY8"/>
+              </a:cxn>
+            </a:cxnLst>
+            <a:rect l="l" t="t" r="r" b="b"/>
+            <a:pathLst>
+              <a:path w="8128000" h="1597050">
+                <a:moveTo>
+                  <a:pt x="0" y="266180"/>
+                </a:moveTo>
+                <a:cubicBezTo>
+                  <a:pt x="0" y="119173"/>
+                  <a:pt x="119173" y="0"/>
+                  <a:pt x="266180" y="0"/>
+                </a:cubicBezTo>
+                <a:lnTo>
+                  <a:pt x="7861820" y="0"/>
+                </a:lnTo>
+                <a:cubicBezTo>
+                  <a:pt x="8008827" y="0"/>
+                  <a:pt x="8128000" y="119173"/>
+                  <a:pt x="8128000" y="266180"/>
+                </a:cubicBezTo>
+                <a:lnTo>
+                  <a:pt x="8128000" y="1330870"/>
+                </a:lnTo>
+                <a:cubicBezTo>
+                  <a:pt x="8128000" y="1477877"/>
+                  <a:pt x="8008827" y="1597050"/>
+                  <a:pt x="7861820" y="1597050"/>
+                </a:cubicBezTo>
+                <a:lnTo>
+                  <a:pt x="266180" y="1597050"/>
+                </a:lnTo>
+                <a:cubicBezTo>
+                  <a:pt x="119173" y="1597050"/>
+                  <a:pt x="0" y="1477877"/>
+                  <a:pt x="0" y="1330870"/>
+                </a:cubicBezTo>
+                <a:lnTo>
+                  <a:pt x="0" y="266180"/>
+                </a:lnTo>
+                <a:close/>
+              </a:path>
+            </a:pathLst>
+          </a:custGeom>
+          <a:solidFill>
+            <a:srgbClr val="00A5E1"/>
+          </a:solidFill>
+        </p:spPr>
+        <p:style>
+          <a:lnRef idx="2">
+            <a:schemeClr val="lt1">
+              <a:hueOff val="0"/>
+              <a:satOff val="0"/>
+              <a:lumOff val="0"/>
+              <a:alphaOff val="0"/>
+            </a:schemeClr>
+          </a:lnRef>
+          <a:fillRef idx="1">
+            <a:scrgbClr r="0" g="0" b="0"/>
+          </a:fillRef>
+          <a:effectRef idx="0">
+            <a:schemeClr val="accent1">
+              <a:hueOff val="0"/>
+              <a:satOff val="0"/>
+              <a:lumOff val="0"/>
+              <a:alphaOff val="0"/>
+            </a:schemeClr>
+          </a:effectRef>
+          <a:fontRef idx="minor">
+            <a:schemeClr val="lt1"/>
+          </a:fontRef>
+        </p:style>
+        <p:txBody>
+          <a:bodyPr spcFirstLastPara="0" vert="horz" wrap="square" lIns="230362" tIns="230362" rIns="230362" bIns="230362" numCol="1" spcCol="1270" anchor="ctr" anchorCtr="0">
+            <a:noAutofit/>
+          </a:bodyPr>
+          <a:lstStyle/>
+          <a:p>
+            <a:pPr marL="0" lvl="0" indent="0" algn="l" defTabSz="1778000">
+              <a:lnSpc>
+                <a:spcPct val="90000"/>
+              </a:lnSpc>
+              <a:spcBef>
+                <a:spcPct val="0"/>
+              </a:spcBef>
+              <a:spcAft>
+                <a:spcPct val="35000"/>
+              </a:spcAft>
+              <a:buNone/>
+            </a:pPr>
+            <a:r>
+              <a:rPr lang="de-DE" sz="4000" kern="1200"/>
+              <a:t>Löst Excel-Tabelle &amp; </a:t>
+            </a:r>
+            <a:r>
+              <a:rPr lang="de-DE" sz="4000" kern="1200" err="1"/>
+              <a:t>Confluence</a:t>
+            </a:r>
+            <a:r>
+              <a:rPr lang="de-DE" sz="4000" kern="1200"/>
+              <a:t> ab</a:t>
+            </a:r>
+          </a:p>
+        </p:txBody>
+      </p:sp>
+      <p:sp>
+        <p:nvSpPr>
+          <p:cNvPr id="16" name="Freihandform: Form 15">
+            <a:extLst>
+              <a:ext uri="{FF2B5EF4-FFF2-40B4-BE49-F238E27FC236}">
+                <a16:creationId xmlns:a16="http://schemas.microsoft.com/office/drawing/2014/main" id="{D3D5BC05-AAA0-5DBE-7B78-5883A9FAF989}"/>
+              </a:ext>
+            </a:extLst>
+          </p:cNvPr>
+          <p:cNvSpPr/>
+          <p:nvPr/>
+        </p:nvSpPr>
+        <p:spPr>
+          <a:xfrm>
+            <a:off x="2032000" y="5233912"/>
+            <a:ext cx="8128000" cy="1076400"/>
+          </a:xfrm>
+          <a:custGeom>
+            <a:avLst/>
+            <a:gdLst>
+              <a:gd name="connsiteX0" fmla="*/ 0 w 8128000"/>
+              <a:gd name="connsiteY0" fmla="*/ 0 h 1076400"/>
+              <a:gd name="connsiteX1" fmla="*/ 8128000 w 8128000"/>
+              <a:gd name="connsiteY1" fmla="*/ 0 h 1076400"/>
+              <a:gd name="connsiteX2" fmla="*/ 8128000 w 8128000"/>
+              <a:gd name="connsiteY2" fmla="*/ 1076400 h 1076400"/>
+              <a:gd name="connsiteX3" fmla="*/ 0 w 8128000"/>
+              <a:gd name="connsiteY3" fmla="*/ 1076400 h 1076400"/>
+              <a:gd name="connsiteX4" fmla="*/ 0 w 8128000"/>
+              <a:gd name="connsiteY4" fmla="*/ 0 h 1076400"/>
+            </a:gdLst>
+            <a:ahLst/>
+            <a:cxnLst>
+              <a:cxn ang="0">
+                <a:pos x="connsiteX0" y="connsiteY0"/>
+              </a:cxn>
+              <a:cxn ang="0">
+                <a:pos x="connsiteX1" y="connsiteY1"/>
+              </a:cxn>
+              <a:cxn ang="0">
+                <a:pos x="connsiteX2" y="connsiteY2"/>
+              </a:cxn>
+              <a:cxn ang="0">
+                <a:pos x="connsiteX3" y="connsiteY3"/>
+              </a:cxn>
+              <a:cxn ang="0">
+                <a:pos x="connsiteX4" y="connsiteY4"/>
+              </a:cxn>
+            </a:cxnLst>
+            <a:rect l="l" t="t" r="r" b="b"/>
+            <a:pathLst>
+              <a:path w="8128000" h="1076400">
+                <a:moveTo>
+                  <a:pt x="0" y="0"/>
+                </a:moveTo>
+                <a:lnTo>
+                  <a:pt x="8128000" y="0"/>
+                </a:lnTo>
+                <a:lnTo>
+                  <a:pt x="8128000" y="1076400"/>
+                </a:lnTo>
+                <a:lnTo>
+                  <a:pt x="0" y="1076400"/>
+                </a:lnTo>
+                <a:lnTo>
+                  <a:pt x="0" y="0"/>
+                </a:lnTo>
+                <a:close/>
+              </a:path>
+            </a:pathLst>
+          </a:custGeom>
+        </p:spPr>
+        <p:style>
+          <a:lnRef idx="0">
+            <a:schemeClr val="dk1">
+              <a:alpha val="0"/>
+              <a:hueOff val="0"/>
+              <a:satOff val="0"/>
+              <a:lumOff val="0"/>
+              <a:alphaOff val="0"/>
+            </a:schemeClr>
+          </a:lnRef>
+          <a:fillRef idx="0">
+            <a:schemeClr val="lt1">
+              <a:alpha val="0"/>
+              <a:hueOff val="0"/>
+              <a:satOff val="0"/>
+              <a:lumOff val="0"/>
+              <a:alphaOff val="0"/>
+            </a:schemeClr>
+          </a:fillRef>
+          <a:effectRef idx="0">
+            <a:schemeClr val="lt1">
+              <a:alpha val="0"/>
+              <a:hueOff val="0"/>
+              <a:satOff val="0"/>
+              <a:lumOff val="0"/>
+              <a:alphaOff val="0"/>
+            </a:schemeClr>
+          </a:effectRef>
+          <a:fontRef idx="minor">
+            <a:schemeClr val="tx1">
+              <a:hueOff val="0"/>
+              <a:satOff val="0"/>
+              <a:lumOff val="0"/>
+              <a:alphaOff val="0"/>
+            </a:schemeClr>
+          </a:fontRef>
+        </p:style>
+        <p:txBody>
+          <a:bodyPr spcFirstLastPara="0" vert="horz" wrap="square" lIns="258064" tIns="39370" rIns="220472" bIns="39370" numCol="1" spcCol="1270" anchor="t" anchorCtr="0">
+            <a:noAutofit/>
+          </a:bodyPr>
+          <a:lstStyle/>
+          <a:p>
+            <a:pPr marL="285750" lvl="1" indent="-285750" algn="l" defTabSz="1377950">
+              <a:lnSpc>
+                <a:spcPct val="90000"/>
+              </a:lnSpc>
+              <a:spcBef>
+                <a:spcPct val="0"/>
+              </a:spcBef>
+              <a:spcAft>
+                <a:spcPct val="20000"/>
+              </a:spcAft>
+              <a:buFontTx/>
+              <a:buChar char="→"/>
+            </a:pPr>
+            <a:r>
+              <a:rPr lang="de-DE" sz="3100" kern="1200">
+                <a:solidFill>
+                  <a:srgbClr val="515151"/>
+                </a:solidFill>
+              </a:rPr>
+              <a:t> Zusammenführen mehrerer Plattformen</a:t>
+            </a:r>
+          </a:p>
+        </p:txBody>
+      </p:sp>
+    </p:spTree>
+    <p:extLst>
+      <p:ext uri="{BB962C8B-B14F-4D97-AF65-F5344CB8AC3E}">
+        <p14:creationId xmlns:p14="http://schemas.microsoft.com/office/powerpoint/2010/main" val="2905519449"/>
+      </p:ext>
+    </p:extLst>
+  </p:cSld>
+  <p:clrMapOvr>
+    <a:masterClrMapping/>
+  </p:clrMapOvr>
+  <p:timing>
+    <p:tnLst>
+      <p:par>
+        <p:cTn id="1" dur="indefinite" restart="never" nodeType="tmRoot">
+          <p:childTnLst>
+            <p:seq concurrent="1" nextAc="seek">
+              <p:cTn id="2" dur="indefinite" nodeType="mainSeq">
+                <p:childTnLst>
+                  <p:par>
+                    <p:cTn id="3" fill="hold">
+                      <p:stCondLst>
+                        <p:cond delay="indefinite"/>
+                      </p:stCondLst>
+                      <p:childTnLst>
+                        <p:par>
+                          <p:cTn id="4" fill="hold">
+                            <p:stCondLst>
+                              <p:cond delay="0"/>
+                            </p:stCondLst>
+                            <p:childTnLst>
+                              <p:par>
+                                <p:cTn id="5" presetID="10" presetClass="entr" presetSubtype="0" fill="hold" grpId="0" nodeType="clickEffect">
+                                  <p:stCondLst>
+                                    <p:cond delay="0"/>
+                                  </p:stCondLst>
+                                  <p:childTnLst>
+                                    <p:set>
+                                      <p:cBhvr>
+                                        <p:cTn id="6" dur="1" fill="hold">
+                                          <p:stCondLst>
+                                            <p:cond delay="0"/>
+                                          </p:stCondLst>
+                                        </p:cTn>
+                                        <p:tgtEl>
+                                          <p:spTgt spid="14"/>
+                                        </p:tgtEl>
+                                        <p:attrNameLst>
+                                          <p:attrName>style.visibility</p:attrName>
+                                        </p:attrNameLst>
+                                      </p:cBhvr>
+                                      <p:to>
+                                        <p:strVal val="visible"/>
+                                      </p:to>
+                                    </p:set>
+                                    <p:animEffect transition="in" filter="fade">
+                                      <p:cBhvr>
+                                        <p:cTn id="7" dur="500"/>
+                                        <p:tgtEl>
+                                          <p:spTgt spid="14"/>
+                                        </p:tgtEl>
+                                      </p:cBhvr>
+                                    </p:animEffect>
+                                  </p:childTnLst>
+                                </p:cTn>
+                              </p:par>
+                            </p:childTnLst>
+                          </p:cTn>
+                        </p:par>
+                      </p:childTnLst>
+                    </p:cTn>
+                  </p:par>
+                  <p:par>
+                    <p:cTn id="8" fill="hold">
+                      <p:stCondLst>
+                        <p:cond delay="indefinite"/>
+                      </p:stCondLst>
+                      <p:childTnLst>
+                        <p:par>
+                          <p:cTn id="9" fill="hold">
+                            <p:stCondLst>
+                              <p:cond delay="0"/>
+                            </p:stCondLst>
+                            <p:childTnLst>
+                              <p:par>
+                                <p:cTn id="10" presetID="10" presetClass="entr" presetSubtype="0" fill="hold" grpId="0" nodeType="clickEffect">
+                                  <p:stCondLst>
+                                    <p:cond delay="0"/>
+                                  </p:stCondLst>
+                                  <p:childTnLst>
+                                    <p:set>
+                                      <p:cBhvr>
+                                        <p:cTn id="11" dur="1" fill="hold">
+                                          <p:stCondLst>
+                                            <p:cond delay="0"/>
+                                          </p:stCondLst>
+                                        </p:cTn>
+                                        <p:tgtEl>
+                                          <p:spTgt spid="15"/>
+                                        </p:tgtEl>
+                                        <p:attrNameLst>
+                                          <p:attrName>style.visibility</p:attrName>
+                                        </p:attrNameLst>
+                                      </p:cBhvr>
+                                      <p:to>
+                                        <p:strVal val="visible"/>
+                                      </p:to>
+                                    </p:set>
+                                    <p:animEffect transition="in" filter="fade">
+                                      <p:cBhvr>
+                                        <p:cTn id="12" dur="500"/>
+                                        <p:tgtEl>
+                                          <p:spTgt spid="15"/>
+                                        </p:tgtEl>
+                                      </p:cBhvr>
+                                    </p:animEffect>
+                                  </p:childTnLst>
+                                </p:cTn>
+                              </p:par>
+                            </p:childTnLst>
+                          </p:cTn>
+                        </p:par>
+                      </p:childTnLst>
+                    </p:cTn>
+                  </p:par>
+                  <p:par>
+                    <p:cTn id="13" fill="hold">
+                      <p:stCondLst>
+                        <p:cond delay="indefinite"/>
+                      </p:stCondLst>
+                      <p:childTnLst>
+                        <p:par>
+                          <p:cTn id="14" fill="hold">
+                            <p:stCondLst>
+                              <p:cond delay="0"/>
+                            </p:stCondLst>
+                            <p:childTnLst>
+                              <p:par>
+                                <p:cTn id="15" presetID="10" presetClass="entr" presetSubtype="0" fill="hold" grpId="0" nodeType="clickEffect">
+                                  <p:stCondLst>
+                                    <p:cond delay="0"/>
+                                  </p:stCondLst>
+                                  <p:childTnLst>
+                                    <p:set>
+                                      <p:cBhvr>
+                                        <p:cTn id="16" dur="1" fill="hold">
+                                          <p:stCondLst>
+                                            <p:cond delay="0"/>
+                                          </p:stCondLst>
+                                        </p:cTn>
+                                        <p:tgtEl>
+                                          <p:spTgt spid="16"/>
+                                        </p:tgtEl>
+                                        <p:attrNameLst>
+                                          <p:attrName>style.visibility</p:attrName>
+                                        </p:attrNameLst>
+                                      </p:cBhvr>
+                                      <p:to>
+                                        <p:strVal val="visible"/>
+                                      </p:to>
+                                    </p:set>
+                                    <p:animEffect transition="in" filter="fade">
+                                      <p:cBhvr>
+                                        <p:cTn id="17" dur="500"/>
+                                        <p:tgtEl>
+                                          <p:spTgt spid="16"/>
+                                        </p:tgtEl>
+                                      </p:cBhvr>
+                                    </p:animEffect>
+                                  </p:childTnLst>
+                                </p:cTn>
+                              </p:par>
+                            </p:childTnLst>
+                          </p:cTn>
+                        </p:par>
+                      </p:childTnLst>
+                    </p:cTn>
+                  </p:par>
+                </p:childTnLst>
+              </p:cTn>
+              <p:prevCondLst>
+                <p:cond evt="onPrev" delay="0">
+                  <p:tgtEl>
+                    <p:sldTgt/>
+                  </p:tgtEl>
+                </p:cond>
+              </p:prevCondLst>
+              <p:nextCondLst>
+                <p:cond evt="onNext" delay="0">
+                  <p:tgtEl>
+                    <p:sldTgt/>
+                  </p:tgtEl>
+                </p:cond>
+              </p:nextCondLst>
+            </p:seq>
+          </p:childTnLst>
+        </p:cTn>
+      </p:par>
+    </p:tnLst>
+    <p:bldLst>
+      <p:bldP spid="14" grpId="0" animBg="1"/>
+      <p:bldP spid="15" grpId="0" animBg="1"/>
+      <p:bldP spid="16" grpId="0"/>
+    </p:bldLst>
+  </p:timing>
+</p:sld>
+</file>
+
+<file path=ppt/slides/slide7.xml><?xml version="1.0" encoding="utf-8"?>
+<p:sld xmlns:a="http://schemas.openxmlformats.org/drawingml/2006/main" xmlns:r="http://schemas.openxmlformats.org/officeDocument/2006/relationships" xmlns:p="http://schemas.openxmlformats.org/presentationml/2006/main">
+  <p:cSld>
+    <p:spTree>
+      <p:nvGrpSpPr>
+        <p:cNvPr id="1" name=""/>
+        <p:cNvGrpSpPr/>
+        <p:nvPr/>
+      </p:nvGrpSpPr>
+      <p:grpSpPr>
+        <a:xfrm>
+          <a:off x="0" y="0"/>
+          <a:ext cx="0" cy="0"/>
+          <a:chOff x="0" y="0"/>
+          <a:chExt cx="0" cy="0"/>
+        </a:xfrm>
+      </p:grpSpPr>
+      <p:sp>
+        <p:nvSpPr>
+          <p:cNvPr id="2" name="Titel 1">
+            <a:extLst>
+              <a:ext uri="{FF2B5EF4-FFF2-40B4-BE49-F238E27FC236}">
                 <a16:creationId xmlns:a16="http://schemas.microsoft.com/office/drawing/2014/main" id="{3D03195A-2F8D-88FB-DE79-7A2377DF6916}"/>
               </a:ext>
             </a:extLst>
@@ -22624,7 +23422,7 @@
           <a:p>
             <a:fld id="{89FC54A0-61CC-4F67-9F0E-F272352AC899}" type="slidenum">
               <a:rPr lang="de-DE" smtClean="0"/>
-              <a:t>6</a:t>
+              <a:t>7</a:t>
             </a:fld>
             <a:endParaRPr lang="de-DE"/>
           </a:p>
@@ -25307,767 +26105,6 @@
 </p:sld>
 </file>
 
-<file path=ppt/slides/slide7.xml><?xml version="1.0" encoding="utf-8"?>
-<p:sld xmlns:a="http://schemas.openxmlformats.org/drawingml/2006/main" xmlns:r="http://schemas.openxmlformats.org/officeDocument/2006/relationships" xmlns:p="http://schemas.openxmlformats.org/presentationml/2006/main">
-  <p:cSld>
-    <p:spTree>
-      <p:nvGrpSpPr>
-        <p:cNvPr id="1" name=""/>
-        <p:cNvGrpSpPr/>
-        <p:nvPr/>
-      </p:nvGrpSpPr>
-      <p:grpSpPr>
-        <a:xfrm>
-          <a:off x="0" y="0"/>
-          <a:ext cx="0" cy="0"/>
-          <a:chOff x="0" y="0"/>
-          <a:chExt cx="0" cy="0"/>
-        </a:xfrm>
-      </p:grpSpPr>
-      <p:sp>
-        <p:nvSpPr>
-          <p:cNvPr id="2" name="Titel 1">
-            <a:extLst>
-              <a:ext uri="{FF2B5EF4-FFF2-40B4-BE49-F238E27FC236}">
-                <a16:creationId xmlns:a16="http://schemas.microsoft.com/office/drawing/2014/main" id="{51B73323-BE47-CBF1-1728-BAAB86B82B5D}"/>
-              </a:ext>
-            </a:extLst>
-          </p:cNvPr>
-          <p:cNvSpPr>
-            <a:spLocks noGrp="1"/>
-          </p:cNvSpPr>
-          <p:nvPr>
-            <p:ph type="title"/>
-          </p:nvPr>
-        </p:nvSpPr>
-        <p:spPr/>
-        <p:txBody>
-          <a:bodyPr>
-            <a:normAutofit fontScale="90000"/>
-          </a:bodyPr>
-          <a:lstStyle/>
-          <a:p>
-            <a:r>
-              <a:rPr lang="de-DE">
-                <a:cs typeface="Calibri Light"/>
-              </a:rPr>
-              <a:t>Projekt</a:t>
-            </a:r>
-            <a:endParaRPr lang="de-DE"/>
-          </a:p>
-        </p:txBody>
-      </p:sp>
-      <p:sp>
-        <p:nvSpPr>
-          <p:cNvPr id="5" name="Foliennummernplatzhalter 4">
-            <a:extLst>
-              <a:ext uri="{FF2B5EF4-FFF2-40B4-BE49-F238E27FC236}">
-                <a16:creationId xmlns:a16="http://schemas.microsoft.com/office/drawing/2014/main" id="{BCE830FB-0B68-E833-D5A1-5B700A2601D9}"/>
-              </a:ext>
-            </a:extLst>
-          </p:cNvPr>
-          <p:cNvSpPr>
-            <a:spLocks noGrp="1"/>
-          </p:cNvSpPr>
-          <p:nvPr>
-            <p:ph type="sldNum" sz="quarter" idx="12"/>
-          </p:nvPr>
-        </p:nvSpPr>
-        <p:spPr/>
-        <p:txBody>
-          <a:bodyPr/>
-          <a:lstStyle/>
-          <a:p>
-            <a:fld id="{89FC54A0-61CC-4F67-9F0E-F272352AC899}" type="slidenum">
-              <a:rPr lang="de-DE" smtClean="0"/>
-              <a:t>7</a:t>
-            </a:fld>
-            <a:endParaRPr lang="de-DE"/>
-          </a:p>
-        </p:txBody>
-      </p:sp>
-      <p:sp>
-        <p:nvSpPr>
-          <p:cNvPr id="14" name="Freihandform: Form 13">
-            <a:extLst>
-              <a:ext uri="{FF2B5EF4-FFF2-40B4-BE49-F238E27FC236}">
-                <a16:creationId xmlns:a16="http://schemas.microsoft.com/office/drawing/2014/main" id="{C7323C94-3B52-A43D-9452-34D25FF840DF}"/>
-              </a:ext>
-            </a:extLst>
-          </p:cNvPr>
-          <p:cNvSpPr/>
-          <p:nvPr/>
-        </p:nvSpPr>
-        <p:spPr>
-          <a:xfrm>
-            <a:off x="2032000" y="1852612"/>
-            <a:ext cx="8128000" cy="1597050"/>
-          </a:xfrm>
-          <a:custGeom>
-            <a:avLst/>
-            <a:gdLst>
-              <a:gd name="connsiteX0" fmla="*/ 0 w 8128000"/>
-              <a:gd name="connsiteY0" fmla="*/ 266180 h 1597050"/>
-              <a:gd name="connsiteX1" fmla="*/ 266180 w 8128000"/>
-              <a:gd name="connsiteY1" fmla="*/ 0 h 1597050"/>
-              <a:gd name="connsiteX2" fmla="*/ 7861820 w 8128000"/>
-              <a:gd name="connsiteY2" fmla="*/ 0 h 1597050"/>
-              <a:gd name="connsiteX3" fmla="*/ 8128000 w 8128000"/>
-              <a:gd name="connsiteY3" fmla="*/ 266180 h 1597050"/>
-              <a:gd name="connsiteX4" fmla="*/ 8128000 w 8128000"/>
-              <a:gd name="connsiteY4" fmla="*/ 1330870 h 1597050"/>
-              <a:gd name="connsiteX5" fmla="*/ 7861820 w 8128000"/>
-              <a:gd name="connsiteY5" fmla="*/ 1597050 h 1597050"/>
-              <a:gd name="connsiteX6" fmla="*/ 266180 w 8128000"/>
-              <a:gd name="connsiteY6" fmla="*/ 1597050 h 1597050"/>
-              <a:gd name="connsiteX7" fmla="*/ 0 w 8128000"/>
-              <a:gd name="connsiteY7" fmla="*/ 1330870 h 1597050"/>
-              <a:gd name="connsiteX8" fmla="*/ 0 w 8128000"/>
-              <a:gd name="connsiteY8" fmla="*/ 266180 h 1597050"/>
-            </a:gdLst>
-            <a:ahLst/>
-            <a:cxnLst>
-              <a:cxn ang="0">
-                <a:pos x="connsiteX0" y="connsiteY0"/>
-              </a:cxn>
-              <a:cxn ang="0">
-                <a:pos x="connsiteX1" y="connsiteY1"/>
-              </a:cxn>
-              <a:cxn ang="0">
-                <a:pos x="connsiteX2" y="connsiteY2"/>
-              </a:cxn>
-              <a:cxn ang="0">
-                <a:pos x="connsiteX3" y="connsiteY3"/>
-              </a:cxn>
-              <a:cxn ang="0">
-                <a:pos x="connsiteX4" y="connsiteY4"/>
-              </a:cxn>
-              <a:cxn ang="0">
-                <a:pos x="connsiteX5" y="connsiteY5"/>
-              </a:cxn>
-              <a:cxn ang="0">
-                <a:pos x="connsiteX6" y="connsiteY6"/>
-              </a:cxn>
-              <a:cxn ang="0">
-                <a:pos x="connsiteX7" y="connsiteY7"/>
-              </a:cxn>
-              <a:cxn ang="0">
-                <a:pos x="connsiteX8" y="connsiteY8"/>
-              </a:cxn>
-            </a:cxnLst>
-            <a:rect l="l" t="t" r="r" b="b"/>
-            <a:pathLst>
-              <a:path w="8128000" h="1597050">
-                <a:moveTo>
-                  <a:pt x="0" y="266180"/>
-                </a:moveTo>
-                <a:cubicBezTo>
-                  <a:pt x="0" y="119173"/>
-                  <a:pt x="119173" y="0"/>
-                  <a:pt x="266180" y="0"/>
-                </a:cubicBezTo>
-                <a:lnTo>
-                  <a:pt x="7861820" y="0"/>
-                </a:lnTo>
-                <a:cubicBezTo>
-                  <a:pt x="8008827" y="0"/>
-                  <a:pt x="8128000" y="119173"/>
-                  <a:pt x="8128000" y="266180"/>
-                </a:cubicBezTo>
-                <a:lnTo>
-                  <a:pt x="8128000" y="1330870"/>
-                </a:lnTo>
-                <a:cubicBezTo>
-                  <a:pt x="8128000" y="1477877"/>
-                  <a:pt x="8008827" y="1597050"/>
-                  <a:pt x="7861820" y="1597050"/>
-                </a:cubicBezTo>
-                <a:lnTo>
-                  <a:pt x="266180" y="1597050"/>
-                </a:lnTo>
-                <a:cubicBezTo>
-                  <a:pt x="119173" y="1597050"/>
-                  <a:pt x="0" y="1477877"/>
-                  <a:pt x="0" y="1330870"/>
-                </a:cubicBezTo>
-                <a:lnTo>
-                  <a:pt x="0" y="266180"/>
-                </a:lnTo>
-                <a:close/>
-              </a:path>
-            </a:pathLst>
-          </a:custGeom>
-          <a:solidFill>
-            <a:srgbClr val="00A5E1"/>
-          </a:solidFill>
-        </p:spPr>
-        <p:style>
-          <a:lnRef idx="2">
-            <a:schemeClr val="lt1">
-              <a:hueOff val="0"/>
-              <a:satOff val="0"/>
-              <a:lumOff val="0"/>
-              <a:alphaOff val="0"/>
-            </a:schemeClr>
-          </a:lnRef>
-          <a:fillRef idx="1">
-            <a:scrgbClr r="0" g="0" b="0"/>
-          </a:fillRef>
-          <a:effectRef idx="0">
-            <a:schemeClr val="accent1">
-              <a:hueOff val="0"/>
-              <a:satOff val="0"/>
-              <a:lumOff val="0"/>
-              <a:alphaOff val="0"/>
-            </a:schemeClr>
-          </a:effectRef>
-          <a:fontRef idx="minor">
-            <a:schemeClr val="lt1"/>
-          </a:fontRef>
-        </p:style>
-        <p:txBody>
-          <a:bodyPr spcFirstLastPara="0" vert="horz" wrap="square" lIns="230362" tIns="230362" rIns="230362" bIns="230362" numCol="1" spcCol="1270" anchor="ctr" anchorCtr="0">
-            <a:noAutofit/>
-          </a:bodyPr>
-          <a:lstStyle/>
-          <a:p>
-            <a:pPr marL="0" lvl="0" indent="0" algn="l" defTabSz="1778000">
-              <a:lnSpc>
-                <a:spcPct val="90000"/>
-              </a:lnSpc>
-              <a:spcBef>
-                <a:spcPct val="0"/>
-              </a:spcBef>
-              <a:spcAft>
-                <a:spcPct val="35000"/>
-              </a:spcAft>
-              <a:buNone/>
-            </a:pPr>
-            <a:r>
-              <a:rPr lang="de-DE" sz="4000" kern="1200"/>
-              <a:t>Webplattform für die Sport Challenge</a:t>
-            </a:r>
-          </a:p>
-        </p:txBody>
-      </p:sp>
-      <p:sp>
-        <p:nvSpPr>
-          <p:cNvPr id="15" name="Freihandform: Form 14">
-            <a:extLst>
-              <a:ext uri="{FF2B5EF4-FFF2-40B4-BE49-F238E27FC236}">
-                <a16:creationId xmlns:a16="http://schemas.microsoft.com/office/drawing/2014/main" id="{1A43487B-6CF5-6D90-1B01-12C42648AD80}"/>
-              </a:ext>
-            </a:extLst>
-          </p:cNvPr>
-          <p:cNvSpPr/>
-          <p:nvPr/>
-        </p:nvSpPr>
-        <p:spPr>
-          <a:xfrm>
-            <a:off x="2032000" y="3636862"/>
-            <a:ext cx="8128000" cy="1597050"/>
-          </a:xfrm>
-          <a:custGeom>
-            <a:avLst/>
-            <a:gdLst>
-              <a:gd name="connsiteX0" fmla="*/ 0 w 8128000"/>
-              <a:gd name="connsiteY0" fmla="*/ 266180 h 1597050"/>
-              <a:gd name="connsiteX1" fmla="*/ 266180 w 8128000"/>
-              <a:gd name="connsiteY1" fmla="*/ 0 h 1597050"/>
-              <a:gd name="connsiteX2" fmla="*/ 7861820 w 8128000"/>
-              <a:gd name="connsiteY2" fmla="*/ 0 h 1597050"/>
-              <a:gd name="connsiteX3" fmla="*/ 8128000 w 8128000"/>
-              <a:gd name="connsiteY3" fmla="*/ 266180 h 1597050"/>
-              <a:gd name="connsiteX4" fmla="*/ 8128000 w 8128000"/>
-              <a:gd name="connsiteY4" fmla="*/ 1330870 h 1597050"/>
-              <a:gd name="connsiteX5" fmla="*/ 7861820 w 8128000"/>
-              <a:gd name="connsiteY5" fmla="*/ 1597050 h 1597050"/>
-              <a:gd name="connsiteX6" fmla="*/ 266180 w 8128000"/>
-              <a:gd name="connsiteY6" fmla="*/ 1597050 h 1597050"/>
-              <a:gd name="connsiteX7" fmla="*/ 0 w 8128000"/>
-              <a:gd name="connsiteY7" fmla="*/ 1330870 h 1597050"/>
-              <a:gd name="connsiteX8" fmla="*/ 0 w 8128000"/>
-              <a:gd name="connsiteY8" fmla="*/ 266180 h 1597050"/>
-            </a:gdLst>
-            <a:ahLst/>
-            <a:cxnLst>
-              <a:cxn ang="0">
-                <a:pos x="connsiteX0" y="connsiteY0"/>
-              </a:cxn>
-              <a:cxn ang="0">
-                <a:pos x="connsiteX1" y="connsiteY1"/>
-              </a:cxn>
-              <a:cxn ang="0">
-                <a:pos x="connsiteX2" y="connsiteY2"/>
-              </a:cxn>
-              <a:cxn ang="0">
-                <a:pos x="connsiteX3" y="connsiteY3"/>
-              </a:cxn>
-              <a:cxn ang="0">
-                <a:pos x="connsiteX4" y="connsiteY4"/>
-              </a:cxn>
-              <a:cxn ang="0">
-                <a:pos x="connsiteX5" y="connsiteY5"/>
-              </a:cxn>
-              <a:cxn ang="0">
-                <a:pos x="connsiteX6" y="connsiteY6"/>
-              </a:cxn>
-              <a:cxn ang="0">
-                <a:pos x="connsiteX7" y="connsiteY7"/>
-              </a:cxn>
-              <a:cxn ang="0">
-                <a:pos x="connsiteX8" y="connsiteY8"/>
-              </a:cxn>
-            </a:cxnLst>
-            <a:rect l="l" t="t" r="r" b="b"/>
-            <a:pathLst>
-              <a:path w="8128000" h="1597050">
-                <a:moveTo>
-                  <a:pt x="0" y="266180"/>
-                </a:moveTo>
-                <a:cubicBezTo>
-                  <a:pt x="0" y="119173"/>
-                  <a:pt x="119173" y="0"/>
-                  <a:pt x="266180" y="0"/>
-                </a:cubicBezTo>
-                <a:lnTo>
-                  <a:pt x="7861820" y="0"/>
-                </a:lnTo>
-                <a:cubicBezTo>
-                  <a:pt x="8008827" y="0"/>
-                  <a:pt x="8128000" y="119173"/>
-                  <a:pt x="8128000" y="266180"/>
-                </a:cubicBezTo>
-                <a:lnTo>
-                  <a:pt x="8128000" y="1330870"/>
-                </a:lnTo>
-                <a:cubicBezTo>
-                  <a:pt x="8128000" y="1477877"/>
-                  <a:pt x="8008827" y="1597050"/>
-                  <a:pt x="7861820" y="1597050"/>
-                </a:cubicBezTo>
-                <a:lnTo>
-                  <a:pt x="266180" y="1597050"/>
-                </a:lnTo>
-                <a:cubicBezTo>
-                  <a:pt x="119173" y="1597050"/>
-                  <a:pt x="0" y="1477877"/>
-                  <a:pt x="0" y="1330870"/>
-                </a:cubicBezTo>
-                <a:lnTo>
-                  <a:pt x="0" y="266180"/>
-                </a:lnTo>
-                <a:close/>
-              </a:path>
-            </a:pathLst>
-          </a:custGeom>
-          <a:solidFill>
-            <a:srgbClr val="00A5E1"/>
-          </a:solidFill>
-        </p:spPr>
-        <p:style>
-          <a:lnRef idx="2">
-            <a:schemeClr val="lt1">
-              <a:hueOff val="0"/>
-              <a:satOff val="0"/>
-              <a:lumOff val="0"/>
-              <a:alphaOff val="0"/>
-            </a:schemeClr>
-          </a:lnRef>
-          <a:fillRef idx="1">
-            <a:scrgbClr r="0" g="0" b="0"/>
-          </a:fillRef>
-          <a:effectRef idx="0">
-            <a:schemeClr val="accent1">
-              <a:hueOff val="0"/>
-              <a:satOff val="0"/>
-              <a:lumOff val="0"/>
-              <a:alphaOff val="0"/>
-            </a:schemeClr>
-          </a:effectRef>
-          <a:fontRef idx="minor">
-            <a:schemeClr val="lt1"/>
-          </a:fontRef>
-        </p:style>
-        <p:txBody>
-          <a:bodyPr spcFirstLastPara="0" vert="horz" wrap="square" lIns="230362" tIns="230362" rIns="230362" bIns="230362" numCol="1" spcCol="1270" anchor="ctr" anchorCtr="0">
-            <a:noAutofit/>
-          </a:bodyPr>
-          <a:lstStyle/>
-          <a:p>
-            <a:pPr marL="0" lvl="0" indent="0" algn="l" defTabSz="1778000">
-              <a:lnSpc>
-                <a:spcPct val="90000"/>
-              </a:lnSpc>
-              <a:spcBef>
-                <a:spcPct val="0"/>
-              </a:spcBef>
-              <a:spcAft>
-                <a:spcPct val="35000"/>
-              </a:spcAft>
-              <a:buNone/>
-            </a:pPr>
-            <a:r>
-              <a:rPr lang="de-DE" sz="4000" kern="1200"/>
-              <a:t>Löst Excel-Tabelle &amp; </a:t>
-            </a:r>
-            <a:r>
-              <a:rPr lang="de-DE" sz="4000" kern="1200" err="1"/>
-              <a:t>Confluence</a:t>
-            </a:r>
-            <a:r>
-              <a:rPr lang="de-DE" sz="4000" kern="1200"/>
-              <a:t> ab</a:t>
-            </a:r>
-          </a:p>
-        </p:txBody>
-      </p:sp>
-      <p:sp>
-        <p:nvSpPr>
-          <p:cNvPr id="16" name="Freihandform: Form 15">
-            <a:extLst>
-              <a:ext uri="{FF2B5EF4-FFF2-40B4-BE49-F238E27FC236}">
-                <a16:creationId xmlns:a16="http://schemas.microsoft.com/office/drawing/2014/main" id="{D3D5BC05-AAA0-5DBE-7B78-5883A9FAF989}"/>
-              </a:ext>
-            </a:extLst>
-          </p:cNvPr>
-          <p:cNvSpPr/>
-          <p:nvPr/>
-        </p:nvSpPr>
-        <p:spPr>
-          <a:xfrm>
-            <a:off x="2032000" y="5233912"/>
-            <a:ext cx="8128000" cy="1076400"/>
-          </a:xfrm>
-          <a:custGeom>
-            <a:avLst/>
-            <a:gdLst>
-              <a:gd name="connsiteX0" fmla="*/ 0 w 8128000"/>
-              <a:gd name="connsiteY0" fmla="*/ 0 h 1076400"/>
-              <a:gd name="connsiteX1" fmla="*/ 8128000 w 8128000"/>
-              <a:gd name="connsiteY1" fmla="*/ 0 h 1076400"/>
-              <a:gd name="connsiteX2" fmla="*/ 8128000 w 8128000"/>
-              <a:gd name="connsiteY2" fmla="*/ 1076400 h 1076400"/>
-              <a:gd name="connsiteX3" fmla="*/ 0 w 8128000"/>
-              <a:gd name="connsiteY3" fmla="*/ 1076400 h 1076400"/>
-              <a:gd name="connsiteX4" fmla="*/ 0 w 8128000"/>
-              <a:gd name="connsiteY4" fmla="*/ 0 h 1076400"/>
-            </a:gdLst>
-            <a:ahLst/>
-            <a:cxnLst>
-              <a:cxn ang="0">
-                <a:pos x="connsiteX0" y="connsiteY0"/>
-              </a:cxn>
-              <a:cxn ang="0">
-                <a:pos x="connsiteX1" y="connsiteY1"/>
-              </a:cxn>
-              <a:cxn ang="0">
-                <a:pos x="connsiteX2" y="connsiteY2"/>
-              </a:cxn>
-              <a:cxn ang="0">
-                <a:pos x="connsiteX3" y="connsiteY3"/>
-              </a:cxn>
-              <a:cxn ang="0">
-                <a:pos x="connsiteX4" y="connsiteY4"/>
-              </a:cxn>
-            </a:cxnLst>
-            <a:rect l="l" t="t" r="r" b="b"/>
-            <a:pathLst>
-              <a:path w="8128000" h="1076400">
-                <a:moveTo>
-                  <a:pt x="0" y="0"/>
-                </a:moveTo>
-                <a:lnTo>
-                  <a:pt x="8128000" y="0"/>
-                </a:lnTo>
-                <a:lnTo>
-                  <a:pt x="8128000" y="1076400"/>
-                </a:lnTo>
-                <a:lnTo>
-                  <a:pt x="0" y="1076400"/>
-                </a:lnTo>
-                <a:lnTo>
-                  <a:pt x="0" y="0"/>
-                </a:lnTo>
-                <a:close/>
-              </a:path>
-            </a:pathLst>
-          </a:custGeom>
-        </p:spPr>
-        <p:style>
-          <a:lnRef idx="0">
-            <a:schemeClr val="dk1">
-              <a:alpha val="0"/>
-              <a:hueOff val="0"/>
-              <a:satOff val="0"/>
-              <a:lumOff val="0"/>
-              <a:alphaOff val="0"/>
-            </a:schemeClr>
-          </a:lnRef>
-          <a:fillRef idx="0">
-            <a:schemeClr val="lt1">
-              <a:alpha val="0"/>
-              <a:hueOff val="0"/>
-              <a:satOff val="0"/>
-              <a:lumOff val="0"/>
-              <a:alphaOff val="0"/>
-            </a:schemeClr>
-          </a:fillRef>
-          <a:effectRef idx="0">
-            <a:schemeClr val="lt1">
-              <a:alpha val="0"/>
-              <a:hueOff val="0"/>
-              <a:satOff val="0"/>
-              <a:lumOff val="0"/>
-              <a:alphaOff val="0"/>
-            </a:schemeClr>
-          </a:effectRef>
-          <a:fontRef idx="minor">
-            <a:schemeClr val="tx1">
-              <a:hueOff val="0"/>
-              <a:satOff val="0"/>
-              <a:lumOff val="0"/>
-              <a:alphaOff val="0"/>
-            </a:schemeClr>
-          </a:fontRef>
-        </p:style>
-        <p:txBody>
-          <a:bodyPr spcFirstLastPara="0" vert="horz" wrap="square" lIns="258064" tIns="39370" rIns="220472" bIns="39370" numCol="1" spcCol="1270" anchor="t" anchorCtr="0">
-            <a:noAutofit/>
-          </a:bodyPr>
-          <a:lstStyle/>
-          <a:p>
-            <a:pPr marL="285750" lvl="1" indent="-285750" algn="l" defTabSz="1377950">
-              <a:lnSpc>
-                <a:spcPct val="90000"/>
-              </a:lnSpc>
-              <a:spcBef>
-                <a:spcPct val="0"/>
-              </a:spcBef>
-              <a:spcAft>
-                <a:spcPct val="20000"/>
-              </a:spcAft>
-              <a:buFontTx/>
-              <a:buChar char="→"/>
-            </a:pPr>
-            <a:r>
-              <a:rPr lang="de-DE" sz="3100" kern="1200">
-                <a:solidFill>
-                  <a:srgbClr val="515151"/>
-                </a:solidFill>
-              </a:rPr>
-              <a:t> Zusammenführen mehrerer Plattformen</a:t>
-            </a:r>
-          </a:p>
-        </p:txBody>
-      </p:sp>
-    </p:spTree>
-    <p:extLst>
-      <p:ext uri="{BB962C8B-B14F-4D97-AF65-F5344CB8AC3E}">
-        <p14:creationId xmlns:p14="http://schemas.microsoft.com/office/powerpoint/2010/main" val="2905519449"/>
-      </p:ext>
-    </p:extLst>
-  </p:cSld>
-  <p:clrMapOvr>
-    <a:masterClrMapping/>
-  </p:clrMapOvr>
-  <p:timing>
-    <p:tnLst>
-      <p:par>
-        <p:cTn id="1" dur="indefinite" restart="never" nodeType="tmRoot">
-          <p:childTnLst>
-            <p:seq concurrent="1" nextAc="seek">
-              <p:cTn id="2" dur="indefinite" nodeType="mainSeq">
-                <p:childTnLst>
-                  <p:par>
-                    <p:cTn id="3" fill="hold">
-                      <p:stCondLst>
-                        <p:cond delay="indefinite"/>
-                      </p:stCondLst>
-                      <p:childTnLst>
-                        <p:par>
-                          <p:cTn id="4" fill="hold">
-                            <p:stCondLst>
-                              <p:cond delay="0"/>
-                            </p:stCondLst>
-                            <p:childTnLst>
-                              <p:par>
-                                <p:cTn id="5" presetID="10" presetClass="entr" presetSubtype="0" fill="hold" grpId="0" nodeType="clickEffect">
-                                  <p:stCondLst>
-                                    <p:cond delay="0"/>
-                                  </p:stCondLst>
-                                  <p:childTnLst>
-                                    <p:set>
-                                      <p:cBhvr>
-                                        <p:cTn id="6" dur="1" fill="hold">
-                                          <p:stCondLst>
-                                            <p:cond delay="0"/>
-                                          </p:stCondLst>
-                                        </p:cTn>
-                                        <p:tgtEl>
-                                          <p:spTgt spid="14"/>
-                                        </p:tgtEl>
-                                        <p:attrNameLst>
-                                          <p:attrName>style.visibility</p:attrName>
-                                        </p:attrNameLst>
-                                      </p:cBhvr>
-                                      <p:to>
-                                        <p:strVal val="visible"/>
-                                      </p:to>
-                                    </p:set>
-                                    <p:animEffect transition="in" filter="fade">
-                                      <p:cBhvr>
-                                        <p:cTn id="7" dur="500"/>
-                                        <p:tgtEl>
-                                          <p:spTgt spid="14"/>
-                                        </p:tgtEl>
-                                      </p:cBhvr>
-                                    </p:animEffect>
-                                  </p:childTnLst>
-                                </p:cTn>
-                              </p:par>
-                            </p:childTnLst>
-                          </p:cTn>
-                        </p:par>
-                      </p:childTnLst>
-                    </p:cTn>
-                  </p:par>
-                  <p:par>
-                    <p:cTn id="8" fill="hold">
-                      <p:stCondLst>
-                        <p:cond delay="indefinite"/>
-                      </p:stCondLst>
-                      <p:childTnLst>
-                        <p:par>
-                          <p:cTn id="9" fill="hold">
-                            <p:stCondLst>
-                              <p:cond delay="0"/>
-                            </p:stCondLst>
-                            <p:childTnLst>
-                              <p:par>
-                                <p:cTn id="10" presetID="10" presetClass="entr" presetSubtype="0" fill="hold" grpId="0" nodeType="clickEffect">
-                                  <p:stCondLst>
-                                    <p:cond delay="0"/>
-                                  </p:stCondLst>
-                                  <p:childTnLst>
-                                    <p:set>
-                                      <p:cBhvr>
-                                        <p:cTn id="11" dur="1" fill="hold">
-                                          <p:stCondLst>
-                                            <p:cond delay="0"/>
-                                          </p:stCondLst>
-                                        </p:cTn>
-                                        <p:tgtEl>
-                                          <p:spTgt spid="15"/>
-                                        </p:tgtEl>
-                                        <p:attrNameLst>
-                                          <p:attrName>style.visibility</p:attrName>
-                                        </p:attrNameLst>
-                                      </p:cBhvr>
-                                      <p:to>
-                                        <p:strVal val="visible"/>
-                                      </p:to>
-                                    </p:set>
-                                    <p:animEffect transition="in" filter="fade">
-                                      <p:cBhvr>
-                                        <p:cTn id="12" dur="500"/>
-                                        <p:tgtEl>
-                                          <p:spTgt spid="15"/>
-                                        </p:tgtEl>
-                                      </p:cBhvr>
-                                    </p:animEffect>
-                                  </p:childTnLst>
-                                </p:cTn>
-                              </p:par>
-                            </p:childTnLst>
-                          </p:cTn>
-                        </p:par>
-                      </p:childTnLst>
-                    </p:cTn>
-                  </p:par>
-                  <p:par>
-                    <p:cTn id="13" fill="hold">
-                      <p:stCondLst>
-                        <p:cond delay="indefinite"/>
-                      </p:stCondLst>
-                      <p:childTnLst>
-                        <p:par>
-                          <p:cTn id="14" fill="hold">
-                            <p:stCondLst>
-                              <p:cond delay="0"/>
-                            </p:stCondLst>
-                            <p:childTnLst>
-                              <p:par>
-                                <p:cTn id="15" presetID="10" presetClass="entr" presetSubtype="0" fill="hold" grpId="0" nodeType="clickEffect">
-                                  <p:stCondLst>
-                                    <p:cond delay="0"/>
-                                  </p:stCondLst>
-                                  <p:childTnLst>
-                                    <p:set>
-                                      <p:cBhvr>
-                                        <p:cTn id="16" dur="1" fill="hold">
-                                          <p:stCondLst>
-                                            <p:cond delay="0"/>
-                                          </p:stCondLst>
-                                        </p:cTn>
-                                        <p:tgtEl>
-                                          <p:spTgt spid="16"/>
-                                        </p:tgtEl>
-                                        <p:attrNameLst>
-                                          <p:attrName>style.visibility</p:attrName>
-                                        </p:attrNameLst>
-                                      </p:cBhvr>
-                                      <p:to>
-                                        <p:strVal val="visible"/>
-                                      </p:to>
-                                    </p:set>
-                                    <p:animEffect transition="in" filter="fade">
-                                      <p:cBhvr>
-                                        <p:cTn id="17" dur="500"/>
-                                        <p:tgtEl>
-                                          <p:spTgt spid="16"/>
-                                        </p:tgtEl>
-                                      </p:cBhvr>
-                                    </p:animEffect>
-                                  </p:childTnLst>
-                                </p:cTn>
-                              </p:par>
-                            </p:childTnLst>
-                          </p:cTn>
-                        </p:par>
-                      </p:childTnLst>
-                    </p:cTn>
-                  </p:par>
-                </p:childTnLst>
-              </p:cTn>
-              <p:prevCondLst>
-                <p:cond evt="onPrev" delay="0">
-                  <p:tgtEl>
-                    <p:sldTgt/>
-                  </p:tgtEl>
-                </p:cond>
-              </p:prevCondLst>
-              <p:nextCondLst>
-                <p:cond evt="onNext" delay="0">
-                  <p:tgtEl>
-                    <p:sldTgt/>
-                  </p:tgtEl>
-                </p:cond>
-              </p:nextCondLst>
-            </p:seq>
-          </p:childTnLst>
-        </p:cTn>
-      </p:par>
-    </p:tnLst>
-    <p:bldLst>
-      <p:bldP spid="14" grpId="0" animBg="1"/>
-      <p:bldP spid="15" grpId="0" animBg="1"/>
-      <p:bldP spid="16" grpId="0"/>
-    </p:bldLst>
-  </p:timing>
-</p:sld>
-</file>
-
 <file path=ppt/slides/slide8.xml><?xml version="1.0" encoding="utf-8"?>
 <p:sld xmlns:a="http://schemas.openxmlformats.org/drawingml/2006/main" xmlns:r="http://schemas.openxmlformats.org/officeDocument/2006/relationships" xmlns:p="http://schemas.openxmlformats.org/presentationml/2006/main">
   <p:cSld>

</xml_diff>